<commit_message>
Added DB Schema Page
</commit_message>
<xml_diff>
--- a/Documentation/Presentation.pptx
+++ b/Documentation/Presentation.pptx
@@ -5,7 +5,7 @@
     <p:sldMasterId id="2147483648" r:id="rId1"/>
   </p:sldMasterIdLst>
   <p:notesMasterIdLst>
-    <p:notesMasterId r:id="rId13"/>
+    <p:notesMasterId r:id="rId14"/>
   </p:notesMasterIdLst>
   <p:sldIdLst>
     <p:sldId id="256" r:id="rId2"/>
@@ -13,12 +13,13 @@
     <p:sldId id="259" r:id="rId4"/>
     <p:sldId id="267" r:id="rId5"/>
     <p:sldId id="261" r:id="rId6"/>
-    <p:sldId id="268" r:id="rId7"/>
-    <p:sldId id="269" r:id="rId8"/>
-    <p:sldId id="262" r:id="rId9"/>
-    <p:sldId id="264" r:id="rId10"/>
-    <p:sldId id="263" r:id="rId11"/>
-    <p:sldId id="265" r:id="rId12"/>
+    <p:sldId id="271" r:id="rId7"/>
+    <p:sldId id="268" r:id="rId8"/>
+    <p:sldId id="269" r:id="rId9"/>
+    <p:sldId id="262" r:id="rId10"/>
+    <p:sldId id="264" r:id="rId11"/>
+    <p:sldId id="263" r:id="rId12"/>
+    <p:sldId id="265" r:id="rId13"/>
   </p:sldIdLst>
   <p:sldSz cx="9144000" cy="6858000" type="screen4x3"/>
   <p:notesSz cx="6858000" cy="9144000"/>
@@ -942,6 +943,120 @@
             <a:fld id="{C338E142-AFDC-AE47-9FD3-50F8F6079FF1}" type="slidenum">
               <a:rPr lang="en-US" smtClean="0"/>
               <a:t>5</a:t>
+            </a:fld>
+            <a:endParaRPr lang="en-US"/>
+          </a:p>
+        </p:txBody>
+      </p:sp>
+    </p:spTree>
+    <p:extLst>
+      <p:ext uri="{BB962C8B-B14F-4D97-AF65-F5344CB8AC3E}">
+        <p14:creationId xmlns:p14="http://schemas.microsoft.com/office/powerpoint/2010/main" val="2274047520"/>
+      </p:ext>
+    </p:extLst>
+  </p:cSld>
+  <p:clrMapOvr>
+    <a:masterClrMapping/>
+  </p:clrMapOvr>
+</p:notes>
+</file>
+
+<file path=ppt/notesSlides/notesSlide4.xml><?xml version="1.0" encoding="utf-8"?>
+<p:notes xmlns:a="http://schemas.openxmlformats.org/drawingml/2006/main" xmlns:r="http://schemas.openxmlformats.org/officeDocument/2006/relationships" xmlns:p="http://schemas.openxmlformats.org/presentationml/2006/main">
+  <p:cSld>
+    <p:spTree>
+      <p:nvGrpSpPr>
+        <p:cNvPr id="1" name=""/>
+        <p:cNvGrpSpPr/>
+        <p:nvPr/>
+      </p:nvGrpSpPr>
+      <p:grpSpPr>
+        <a:xfrm>
+          <a:off x="0" y="0"/>
+          <a:ext cx="0" cy="0"/>
+          <a:chOff x="0" y="0"/>
+          <a:chExt cx="0" cy="0"/>
+        </a:xfrm>
+      </p:grpSpPr>
+      <p:sp>
+        <p:nvSpPr>
+          <p:cNvPr id="2" name="Slide Image Placeholder 1"/>
+          <p:cNvSpPr>
+            <a:spLocks noGrp="1" noRot="1" noChangeAspect="1"/>
+          </p:cNvSpPr>
+          <p:nvPr>
+            <p:ph type="sldImg"/>
+          </p:nvPr>
+        </p:nvSpPr>
+        <p:spPr/>
+      </p:sp>
+      <p:sp>
+        <p:nvSpPr>
+          <p:cNvPr id="3" name="Notes Placeholder 2"/>
+          <p:cNvSpPr>
+            <a:spLocks noGrp="1"/>
+          </p:cNvSpPr>
+          <p:nvPr>
+            <p:ph type="body" idx="1"/>
+          </p:nvPr>
+        </p:nvSpPr>
+        <p:spPr/>
+        <p:txBody>
+          <a:bodyPr/>
+          <a:lstStyle/>
+          <a:p>
+            <a:r>
+              <a:rPr lang="en-US" dirty="0" smtClean="0"/>
+              <a:t>Create Courses and Student Accounts</a:t>
+            </a:r>
+          </a:p>
+          <a:p>
+            <a:r>
+              <a:rPr lang="en-US" dirty="0" smtClean="0"/>
+              <a:t>Create Assessments</a:t>
+            </a:r>
+          </a:p>
+          <a:p>
+            <a:r>
+              <a:rPr lang="en-US" dirty="0" smtClean="0"/>
+              <a:t>Add Short Answer and Multiple Choice questions</a:t>
+            </a:r>
+          </a:p>
+          <a:p>
+            <a:r>
+              <a:rPr lang="en-US" dirty="0" smtClean="0"/>
+              <a:t>Update question status</a:t>
+            </a:r>
+          </a:p>
+          <a:p>
+            <a:r>
+              <a:rPr lang="en-US" dirty="0" smtClean="0"/>
+              <a:t>Collect and analysis students’ answer</a:t>
+            </a:r>
+          </a:p>
+          <a:p>
+            <a:endParaRPr lang="en-US" dirty="0"/>
+          </a:p>
+        </p:txBody>
+      </p:sp>
+      <p:sp>
+        <p:nvSpPr>
+          <p:cNvPr id="4" name="Slide Number Placeholder 3"/>
+          <p:cNvSpPr>
+            <a:spLocks noGrp="1"/>
+          </p:cNvSpPr>
+          <p:nvPr>
+            <p:ph type="sldNum" sz="quarter" idx="10"/>
+          </p:nvPr>
+        </p:nvSpPr>
+        <p:spPr/>
+        <p:txBody>
+          <a:bodyPr/>
+          <a:lstStyle/>
+          <a:p>
+            <a:fld id="{C338E142-AFDC-AE47-9FD3-50F8F6079FF1}" type="slidenum">
+              <a:rPr lang="en-US" smtClean="0"/>
+              <a:t>6</a:t>
             </a:fld>
             <a:endParaRPr lang="en-US"/>
           </a:p>
@@ -4779,6 +4894,150 @@
       </p:grpSpPr>
       <p:sp>
         <p:nvSpPr>
+          <p:cNvPr id="2" name="Content Placeholder 1"/>
+          <p:cNvSpPr>
+            <a:spLocks noGrp="1"/>
+          </p:cNvSpPr>
+          <p:nvPr>
+            <p:ph idx="1"/>
+          </p:nvPr>
+        </p:nvSpPr>
+        <p:spPr>
+          <a:xfrm>
+            <a:off x="1709979" y="1352888"/>
+            <a:ext cx="6096000" cy="3657599"/>
+          </a:xfrm>
+        </p:spPr>
+        <p:txBody>
+          <a:bodyPr/>
+          <a:lstStyle/>
+          <a:p>
+            <a:r>
+              <a:rPr lang="en-US" dirty="0" smtClean="0"/>
+              <a:t>Portability for different environment</a:t>
+            </a:r>
+          </a:p>
+          <a:p>
+            <a:r>
+              <a:rPr lang="en-US" dirty="0" smtClean="0"/>
+              <a:t>Open Source</a:t>
+            </a:r>
+          </a:p>
+          <a:p>
+            <a:r>
+              <a:rPr lang="en-US" dirty="0" smtClean="0"/>
+              <a:t>Security</a:t>
+            </a:r>
+          </a:p>
+          <a:p>
+            <a:r>
+              <a:rPr lang="en-US" dirty="0"/>
+              <a:t>Installation </a:t>
+            </a:r>
+            <a:r>
+              <a:rPr lang="en-US" dirty="0" smtClean="0"/>
+              <a:t>kit</a:t>
+            </a:r>
+          </a:p>
+          <a:p>
+            <a:r>
+              <a:rPr lang="en-US" dirty="0" smtClean="0"/>
+              <a:t>Localization</a:t>
+            </a:r>
+          </a:p>
+          <a:p>
+            <a:pPr marL="18288" indent="0">
+              <a:buNone/>
+            </a:pPr>
+            <a:r>
+              <a:rPr lang="en-US" dirty="0" smtClean="0"/>
+              <a:t> </a:t>
+            </a:r>
+          </a:p>
+          <a:p>
+            <a:endParaRPr lang="en-US" dirty="0"/>
+          </a:p>
+        </p:txBody>
+      </p:sp>
+      <p:sp>
+        <p:nvSpPr>
+          <p:cNvPr id="3" name="Title 2"/>
+          <p:cNvSpPr>
+            <a:spLocks noGrp="1"/>
+          </p:cNvSpPr>
+          <p:nvPr>
+            <p:ph type="title"/>
+          </p:nvPr>
+        </p:nvSpPr>
+        <p:spPr/>
+        <p:txBody>
+          <a:bodyPr/>
+          <a:lstStyle/>
+          <a:p>
+            <a:r>
+              <a:rPr lang="en-US" dirty="0" smtClean="0"/>
+              <a:t>The Next Steps </a:t>
+            </a:r>
+            <a:endParaRPr lang="en-US" dirty="0"/>
+          </a:p>
+        </p:txBody>
+      </p:sp>
+      <p:pic>
+        <p:nvPicPr>
+          <p:cNvPr id="4" name="Picture 3"/>
+          <p:cNvPicPr>
+            <a:picLocks noChangeAspect="1"/>
+          </p:cNvPicPr>
+          <p:nvPr/>
+        </p:nvPicPr>
+        <p:blipFill>
+          <a:blip r:embed="rId2"/>
+          <a:stretch>
+            <a:fillRect/>
+          </a:stretch>
+        </p:blipFill>
+        <p:spPr>
+          <a:xfrm>
+            <a:off x="7364822" y="111794"/>
+            <a:ext cx="1660040" cy="917575"/>
+          </a:xfrm>
+          <a:prstGeom prst="rect">
+            <a:avLst/>
+          </a:prstGeom>
+        </p:spPr>
+      </p:pic>
+    </p:spTree>
+    <p:extLst>
+      <p:ext uri="{BB962C8B-B14F-4D97-AF65-F5344CB8AC3E}">
+        <p14:creationId xmlns:p14="http://schemas.microsoft.com/office/powerpoint/2010/main" val="100663824"/>
+      </p:ext>
+    </p:extLst>
+  </p:cSld>
+  <p:clrMapOvr>
+    <a:masterClrMapping/>
+  </p:clrMapOvr>
+</p:sld>
+</file>
+
+<file path=ppt/slides/slide11.xml><?xml version="1.0" encoding="utf-8"?>
+<p:sld xmlns:a="http://schemas.openxmlformats.org/drawingml/2006/main" xmlns:r="http://schemas.openxmlformats.org/officeDocument/2006/relationships" xmlns:p="http://schemas.openxmlformats.org/presentationml/2006/main">
+  <p:cSld>
+    <p:spTree>
+      <p:nvGrpSpPr>
+        <p:cNvPr id="1" name=""/>
+        <p:cNvGrpSpPr/>
+        <p:nvPr/>
+      </p:nvGrpSpPr>
+      <p:grpSpPr>
+        <a:xfrm>
+          <a:off x="0" y="0"/>
+          <a:ext cx="0" cy="0"/>
+          <a:chOff x="0" y="0"/>
+          <a:chExt cx="0" cy="0"/>
+        </a:xfrm>
+      </p:grpSpPr>
+      <p:sp>
+        <p:nvSpPr>
           <p:cNvPr id="3" name="Title 2"/>
           <p:cNvSpPr>
             <a:spLocks noGrp="1"/>
@@ -4837,7 +5096,7 @@
 </p:sld>
 </file>
 
-<file path=ppt/slides/slide11.xml><?xml version="1.0" encoding="utf-8"?>
+<file path=ppt/slides/slide12.xml><?xml version="1.0" encoding="utf-8"?>
 <p:sld xmlns:a="http://schemas.openxmlformats.org/drawingml/2006/main" xmlns:r="http://schemas.openxmlformats.org/officeDocument/2006/relationships" xmlns:p="http://schemas.openxmlformats.org/presentationml/2006/main">
   <p:cSld>
     <p:spTree>
@@ -5905,18 +6164,906 @@
       </p:grpSpPr>
       <p:sp>
         <p:nvSpPr>
-          <p:cNvPr id="2" name="Content Placeholder 1"/>
-          <p:cNvSpPr>
-            <a:spLocks noGrp="1"/>
-          </p:cNvSpPr>
-          <p:nvPr>
-            <p:ph idx="1"/>
+          <p:cNvPr id="3" name="Title 2"/>
+          <p:cNvSpPr>
+            <a:spLocks noGrp="1"/>
+          </p:cNvSpPr>
+          <p:nvPr>
+            <p:ph type="title"/>
           </p:nvPr>
         </p:nvSpPr>
         <p:spPr>
           <a:xfrm>
-            <a:off x="429399" y="622969"/>
-            <a:ext cx="6096000" cy="3657599"/>
+            <a:off x="341247" y="228601"/>
+            <a:ext cx="7543800" cy="914400"/>
+          </a:xfrm>
+        </p:spPr>
+        <p:txBody>
+          <a:bodyPr/>
+          <a:lstStyle/>
+          <a:p>
+            <a:r>
+              <a:rPr lang="en-US" dirty="0" smtClean="0"/>
+              <a:t>Database Schema</a:t>
+            </a:r>
+            <a:endParaRPr lang="en-US" dirty="0"/>
+          </a:p>
+        </p:txBody>
+      </p:sp>
+      <p:pic>
+        <p:nvPicPr>
+          <p:cNvPr id="4" name="Picture 3"/>
+          <p:cNvPicPr>
+            <a:picLocks noChangeAspect="1"/>
+          </p:cNvPicPr>
+          <p:nvPr/>
+        </p:nvPicPr>
+        <p:blipFill>
+          <a:blip r:embed="rId3"/>
+          <a:stretch>
+            <a:fillRect/>
+          </a:stretch>
+        </p:blipFill>
+        <p:spPr>
+          <a:xfrm>
+            <a:off x="7364822" y="111794"/>
+            <a:ext cx="1660040" cy="917575"/>
+          </a:xfrm>
+          <a:prstGeom prst="rect">
+            <a:avLst/>
+          </a:prstGeom>
+        </p:spPr>
+      </p:pic>
+      <p:graphicFrame>
+        <p:nvGraphicFramePr>
+          <p:cNvPr id="12" name="Table 11"/>
+          <p:cNvGraphicFramePr>
+            <a:graphicFrameLocks noGrp="1"/>
+          </p:cNvGraphicFramePr>
+          <p:nvPr>
+            <p:extLst>
+              <p:ext uri="{D42A27DB-BD31-4B8C-83A1-F6EECF244321}">
+                <p14:modId xmlns:p14="http://schemas.microsoft.com/office/powerpoint/2010/main" val="4062088038"/>
+              </p:ext>
+            </p:extLst>
+          </p:nvPr>
+        </p:nvGraphicFramePr>
+        <p:xfrm>
+          <a:off x="6824287" y="3863152"/>
+          <a:ext cx="2123058" cy="2377439"/>
+        </p:xfrm>
+        <a:graphic>
+          <a:graphicData uri="http://schemas.openxmlformats.org/drawingml/2006/table">
+            <a:tbl>
+              <a:tblPr firstRow="1" bandRow="1">
+                <a:tableStyleId>{073A0DAA-6AF3-43AB-8588-CEC1D06C72B9}</a:tableStyleId>
+              </a:tblPr>
+              <a:tblGrid>
+                <a:gridCol w="2123058"/>
+              </a:tblGrid>
+              <a:tr h="0">
+                <a:tc>
+                  <a:txBody>
+                    <a:bodyPr/>
+                    <a:lstStyle/>
+                    <a:p>
+                      <a:pPr marL="0" marR="0" indent="0" algn="l" defTabSz="914400" rtl="0" eaLnBrk="1" fontAlgn="auto" latinLnBrk="0" hangingPunct="1">
+                        <a:lnSpc>
+                          <a:spcPct val="100000"/>
+                        </a:lnSpc>
+                        <a:spcBef>
+                          <a:spcPts val="0"/>
+                        </a:spcBef>
+                        <a:spcAft>
+                          <a:spcPts val="0"/>
+                        </a:spcAft>
+                        <a:buClrTx/>
+                        <a:buSzTx/>
+                        <a:buFontTx/>
+                        <a:buNone/>
+                        <a:tabLst/>
+                        <a:defRPr/>
+                      </a:pPr>
+                      <a:r>
+                        <a:rPr lang="en-US" dirty="0" smtClean="0"/>
+                        <a:t>AssessmentData</a:t>
+                      </a:r>
+                    </a:p>
+                    <a:p>
+                      <a:endParaRPr lang="en-US" dirty="0"/>
+                    </a:p>
+                  </a:txBody>
+                  <a:tcPr/>
+                </a:tc>
+              </a:tr>
+              <a:tr h="370840">
+                <a:tc>
+                  <a:txBody>
+                    <a:bodyPr/>
+                    <a:lstStyle/>
+                    <a:p>
+                      <a:r>
+                        <a:rPr lang="en-US" dirty="0" err="1" smtClean="0"/>
+                        <a:t>QuestionNo</a:t>
+                      </a:r>
+                      <a:endParaRPr lang="en-US" dirty="0" smtClean="0"/>
+                    </a:p>
+                    <a:p>
+                      <a:r>
+                        <a:rPr lang="en-US" dirty="0" err="1" smtClean="0"/>
+                        <a:t>QuestionData</a:t>
+                      </a:r>
+                      <a:endParaRPr lang="en-US" dirty="0" smtClean="0"/>
+                    </a:p>
+                    <a:p>
+                      <a:r>
+                        <a:rPr lang="en-US" dirty="0" err="1" smtClean="0"/>
+                        <a:t>ChoiceA</a:t>
+                      </a:r>
+                      <a:r>
+                        <a:rPr lang="en-US" dirty="0" smtClean="0"/>
+                        <a:t>…</a:t>
+                      </a:r>
+                      <a:r>
+                        <a:rPr lang="en-US" dirty="0" err="1" smtClean="0"/>
+                        <a:t>ChoiceE</a:t>
+                      </a:r>
+                      <a:endParaRPr lang="en-US" dirty="0" smtClean="0"/>
+                    </a:p>
+                    <a:p>
+                      <a:r>
+                        <a:rPr lang="en-US" dirty="0" err="1" smtClean="0"/>
+                        <a:t>QuestionType</a:t>
+                      </a:r>
+                      <a:endParaRPr lang="en-US" dirty="0" smtClean="0"/>
+                    </a:p>
+                    <a:p>
+                      <a:r>
+                        <a:rPr lang="en-US" dirty="0" err="1" smtClean="0"/>
+                        <a:t>QuestionAnswer</a:t>
+                      </a:r>
+                      <a:endParaRPr lang="en-US" dirty="0" smtClean="0"/>
+                    </a:p>
+                    <a:p>
+                      <a:endParaRPr lang="en-US" dirty="0"/>
+                    </a:p>
+                  </a:txBody>
+                  <a:tcPr/>
+                </a:tc>
+              </a:tr>
+            </a:tbl>
+          </a:graphicData>
+        </a:graphic>
+      </p:graphicFrame>
+      <p:graphicFrame>
+        <p:nvGraphicFramePr>
+          <p:cNvPr id="13" name="Table 12"/>
+          <p:cNvGraphicFramePr>
+            <a:graphicFrameLocks noGrp="1"/>
+          </p:cNvGraphicFramePr>
+          <p:nvPr>
+            <p:extLst>
+              <p:ext uri="{D42A27DB-BD31-4B8C-83A1-F6EECF244321}">
+                <p14:modId xmlns:p14="http://schemas.microsoft.com/office/powerpoint/2010/main" val="672406842"/>
+              </p:ext>
+            </p:extLst>
+          </p:nvPr>
+        </p:nvGraphicFramePr>
+        <p:xfrm>
+          <a:off x="4384275" y="4351214"/>
+          <a:ext cx="1515708" cy="1828800"/>
+        </p:xfrm>
+        <a:graphic>
+          <a:graphicData uri="http://schemas.openxmlformats.org/drawingml/2006/table">
+            <a:tbl>
+              <a:tblPr firstRow="1" bandRow="1">
+                <a:tableStyleId>{073A0DAA-6AF3-43AB-8588-CEC1D06C72B9}</a:tableStyleId>
+              </a:tblPr>
+              <a:tblGrid>
+                <a:gridCol w="1515708"/>
+              </a:tblGrid>
+              <a:tr h="601908">
+                <a:tc>
+                  <a:txBody>
+                    <a:bodyPr/>
+                    <a:lstStyle/>
+                    <a:p>
+                      <a:pPr marL="0" marR="0" indent="0" algn="l" defTabSz="914400" rtl="0" eaLnBrk="1" fontAlgn="auto" latinLnBrk="0" hangingPunct="1">
+                        <a:lnSpc>
+                          <a:spcPct val="100000"/>
+                        </a:lnSpc>
+                        <a:spcBef>
+                          <a:spcPts val="0"/>
+                        </a:spcBef>
+                        <a:spcAft>
+                          <a:spcPts val="0"/>
+                        </a:spcAft>
+                        <a:buClrTx/>
+                        <a:buSzTx/>
+                        <a:buFontTx/>
+                        <a:buNone/>
+                        <a:tabLst/>
+                        <a:defRPr/>
+                      </a:pPr>
+                      <a:r>
+                        <a:rPr lang="en-US" dirty="0" smtClean="0"/>
+                        <a:t>Assessment</a:t>
+                      </a:r>
+                    </a:p>
+                    <a:p>
+                      <a:endParaRPr lang="en-US" dirty="0"/>
+                    </a:p>
+                  </a:txBody>
+                  <a:tcPr/>
+                </a:tc>
+              </a:tr>
+              <a:tr h="370840">
+                <a:tc>
+                  <a:txBody>
+                    <a:bodyPr/>
+                    <a:lstStyle/>
+                    <a:p>
+                      <a:r>
+                        <a:rPr lang="en-US" dirty="0" smtClean="0"/>
+                        <a:t>Name</a:t>
+                      </a:r>
+                    </a:p>
+                    <a:p>
+                      <a:r>
+                        <a:rPr lang="en-US" dirty="0" err="1" smtClean="0"/>
+                        <a:t>PostDate</a:t>
+                      </a:r>
+                      <a:endParaRPr lang="en-US" dirty="0" smtClean="0"/>
+                    </a:p>
+                    <a:p>
+                      <a:r>
+                        <a:rPr lang="en-US" dirty="0" smtClean="0"/>
+                        <a:t>Post</a:t>
+                      </a:r>
+                    </a:p>
+                    <a:p>
+                      <a:endParaRPr lang="en-US" dirty="0"/>
+                    </a:p>
+                  </a:txBody>
+                  <a:tcPr/>
+                </a:tc>
+              </a:tr>
+            </a:tbl>
+          </a:graphicData>
+        </a:graphic>
+      </p:graphicFrame>
+      <p:graphicFrame>
+        <p:nvGraphicFramePr>
+          <p:cNvPr id="14" name="Table 13"/>
+          <p:cNvGraphicFramePr>
+            <a:graphicFrameLocks noGrp="1"/>
+          </p:cNvGraphicFramePr>
+          <p:nvPr>
+            <p:extLst>
+              <p:ext uri="{D42A27DB-BD31-4B8C-83A1-F6EECF244321}">
+                <p14:modId xmlns:p14="http://schemas.microsoft.com/office/powerpoint/2010/main" val="1490035476"/>
+              </p:ext>
+            </p:extLst>
+          </p:nvPr>
+        </p:nvGraphicFramePr>
+        <p:xfrm>
+          <a:off x="2370704" y="4488374"/>
+          <a:ext cx="1061138" cy="1554479"/>
+        </p:xfrm>
+        <a:graphic>
+          <a:graphicData uri="http://schemas.openxmlformats.org/drawingml/2006/table">
+            <a:tbl>
+              <a:tblPr firstRow="1" bandRow="1">
+                <a:tableStyleId>{073A0DAA-6AF3-43AB-8588-CEC1D06C72B9}</a:tableStyleId>
+              </a:tblPr>
+              <a:tblGrid>
+                <a:gridCol w="1061138"/>
+              </a:tblGrid>
+              <a:tr h="546406">
+                <a:tc>
+                  <a:txBody>
+                    <a:bodyPr/>
+                    <a:lstStyle/>
+                    <a:p>
+                      <a:pPr marL="0" marR="0" indent="0" algn="l" defTabSz="914400" rtl="0" eaLnBrk="1" fontAlgn="auto" latinLnBrk="0" hangingPunct="1">
+                        <a:lnSpc>
+                          <a:spcPct val="100000"/>
+                        </a:lnSpc>
+                        <a:spcBef>
+                          <a:spcPts val="0"/>
+                        </a:spcBef>
+                        <a:spcAft>
+                          <a:spcPts val="0"/>
+                        </a:spcAft>
+                        <a:buClrTx/>
+                        <a:buSzTx/>
+                        <a:buFontTx/>
+                        <a:buNone/>
+                        <a:tabLst/>
+                        <a:defRPr/>
+                      </a:pPr>
+                      <a:r>
+                        <a:rPr lang="en-US" dirty="0" smtClean="0"/>
+                        <a:t>Courses</a:t>
+                      </a:r>
+                    </a:p>
+                    <a:p>
+                      <a:endParaRPr lang="en-US" dirty="0"/>
+                    </a:p>
+                  </a:txBody>
+                  <a:tcPr/>
+                </a:tc>
+              </a:tr>
+              <a:tr h="780580">
+                <a:tc>
+                  <a:txBody>
+                    <a:bodyPr/>
+                    <a:lstStyle/>
+                    <a:p>
+                      <a:r>
+                        <a:rPr lang="en-US" dirty="0" smtClean="0"/>
+                        <a:t>Name</a:t>
+                      </a:r>
+                    </a:p>
+                    <a:p>
+                      <a:r>
+                        <a:rPr lang="en-US" dirty="0" smtClean="0"/>
+                        <a:t>Code</a:t>
+                      </a:r>
+                    </a:p>
+                    <a:p>
+                      <a:endParaRPr lang="en-US" dirty="0"/>
+                    </a:p>
+                  </a:txBody>
+                  <a:tcPr/>
+                </a:tc>
+              </a:tr>
+            </a:tbl>
+          </a:graphicData>
+        </a:graphic>
+      </p:graphicFrame>
+      <p:graphicFrame>
+        <p:nvGraphicFramePr>
+          <p:cNvPr id="15" name="Table 14"/>
+          <p:cNvGraphicFramePr>
+            <a:graphicFrameLocks noGrp="1"/>
+          </p:cNvGraphicFramePr>
+          <p:nvPr>
+            <p:extLst>
+              <p:ext uri="{D42A27DB-BD31-4B8C-83A1-F6EECF244321}">
+                <p14:modId xmlns:p14="http://schemas.microsoft.com/office/powerpoint/2010/main" val="4167361910"/>
+              </p:ext>
+            </p:extLst>
+          </p:nvPr>
+        </p:nvGraphicFramePr>
+        <p:xfrm>
+          <a:off x="7316736" y="1689406"/>
+          <a:ext cx="1136622" cy="1554479"/>
+        </p:xfrm>
+        <a:graphic>
+          <a:graphicData uri="http://schemas.openxmlformats.org/drawingml/2006/table">
+            <a:tbl>
+              <a:tblPr firstRow="1" bandRow="1">
+                <a:tableStyleId>{073A0DAA-6AF3-43AB-8588-CEC1D06C72B9}</a:tableStyleId>
+              </a:tblPr>
+              <a:tblGrid>
+                <a:gridCol w="1136622"/>
+              </a:tblGrid>
+              <a:tr h="601908">
+                <a:tc>
+                  <a:txBody>
+                    <a:bodyPr/>
+                    <a:lstStyle/>
+                    <a:p>
+                      <a:pPr marL="0" marR="0" indent="0" algn="l" defTabSz="914400" rtl="0" eaLnBrk="1" fontAlgn="auto" latinLnBrk="0" hangingPunct="1">
+                        <a:lnSpc>
+                          <a:spcPct val="100000"/>
+                        </a:lnSpc>
+                        <a:spcBef>
+                          <a:spcPts val="0"/>
+                        </a:spcBef>
+                        <a:spcAft>
+                          <a:spcPts val="0"/>
+                        </a:spcAft>
+                        <a:buClrTx/>
+                        <a:buSzTx/>
+                        <a:buFontTx/>
+                        <a:buNone/>
+                        <a:tabLst/>
+                        <a:defRPr/>
+                      </a:pPr>
+                      <a:r>
+                        <a:rPr lang="en-US" dirty="0" smtClean="0"/>
+                        <a:t>Student</a:t>
+                      </a:r>
+                    </a:p>
+                    <a:p>
+                      <a:pPr marL="0" marR="0" indent="0" algn="l" defTabSz="914400" rtl="0" eaLnBrk="1" fontAlgn="auto" latinLnBrk="0" hangingPunct="1">
+                        <a:lnSpc>
+                          <a:spcPct val="100000"/>
+                        </a:lnSpc>
+                        <a:spcBef>
+                          <a:spcPts val="0"/>
+                        </a:spcBef>
+                        <a:spcAft>
+                          <a:spcPts val="0"/>
+                        </a:spcAft>
+                        <a:buClrTx/>
+                        <a:buSzTx/>
+                        <a:buFontTx/>
+                        <a:buNone/>
+                        <a:tabLst/>
+                        <a:defRPr/>
+                      </a:pPr>
+                      <a:r>
+                        <a:rPr lang="en-US" dirty="0" smtClean="0"/>
+                        <a:t>Answer</a:t>
+                      </a:r>
+                    </a:p>
+                    <a:p>
+                      <a:endParaRPr lang="en-US" dirty="0"/>
+                    </a:p>
+                  </a:txBody>
+                  <a:tcPr/>
+                </a:tc>
+              </a:tr>
+              <a:tr h="370840">
+                <a:tc>
+                  <a:txBody>
+                    <a:bodyPr/>
+                    <a:lstStyle/>
+                    <a:p>
+                      <a:r>
+                        <a:rPr lang="en-US" dirty="0" smtClean="0"/>
+                        <a:t>Answer</a:t>
+                      </a:r>
+                    </a:p>
+                    <a:p>
+                      <a:endParaRPr lang="en-US" dirty="0"/>
+                    </a:p>
+                  </a:txBody>
+                  <a:tcPr/>
+                </a:tc>
+              </a:tr>
+            </a:tbl>
+          </a:graphicData>
+        </a:graphic>
+      </p:graphicFrame>
+      <p:cxnSp>
+        <p:nvCxnSpPr>
+          <p:cNvPr id="38" name="Straight Connector 37"/>
+          <p:cNvCxnSpPr>
+            <a:endCxn id="12" idx="0"/>
+          </p:cNvCxnSpPr>
+          <p:nvPr/>
+        </p:nvCxnSpPr>
+        <p:spPr>
+          <a:xfrm>
+            <a:off x="7885082" y="3243885"/>
+            <a:ext cx="734" cy="619267"/>
+          </a:xfrm>
+          <a:prstGeom prst="line">
+            <a:avLst/>
+          </a:prstGeom>
+          <a:ln w="127000">
+            <a:solidFill>
+              <a:schemeClr val="tx1"/>
+            </a:solidFill>
+            <a:tailEnd type="triangle"/>
+          </a:ln>
+        </p:spPr>
+        <p:style>
+          <a:lnRef idx="2">
+            <a:schemeClr val="accent1"/>
+          </a:lnRef>
+          <a:fillRef idx="0">
+            <a:schemeClr val="accent1"/>
+          </a:fillRef>
+          <a:effectRef idx="1">
+            <a:schemeClr val="accent1"/>
+          </a:effectRef>
+          <a:fontRef idx="minor">
+            <a:schemeClr val="tx1"/>
+          </a:fontRef>
+        </p:style>
+      </p:cxnSp>
+      <p:cxnSp>
+        <p:nvCxnSpPr>
+          <p:cNvPr id="43" name="Straight Connector 42"/>
+          <p:cNvCxnSpPr/>
+          <p:nvPr/>
+        </p:nvCxnSpPr>
+        <p:spPr>
+          <a:xfrm flipH="1">
+            <a:off x="5899983" y="5265614"/>
+            <a:ext cx="924304" cy="0"/>
+          </a:xfrm>
+          <a:prstGeom prst="line">
+            <a:avLst/>
+          </a:prstGeom>
+          <a:ln w="127000">
+            <a:solidFill>
+              <a:schemeClr val="tx1"/>
+            </a:solidFill>
+            <a:tailEnd type="triangle"/>
+          </a:ln>
+        </p:spPr>
+        <p:style>
+          <a:lnRef idx="2">
+            <a:schemeClr val="accent1"/>
+          </a:lnRef>
+          <a:fillRef idx="0">
+            <a:schemeClr val="accent1"/>
+          </a:fillRef>
+          <a:effectRef idx="1">
+            <a:schemeClr val="accent1"/>
+          </a:effectRef>
+          <a:fontRef idx="minor">
+            <a:schemeClr val="tx1"/>
+          </a:fontRef>
+        </p:style>
+      </p:cxnSp>
+      <p:cxnSp>
+        <p:nvCxnSpPr>
+          <p:cNvPr id="46" name="Straight Connector 45"/>
+          <p:cNvCxnSpPr>
+            <a:stCxn id="13" idx="1"/>
+          </p:cNvCxnSpPr>
+          <p:nvPr/>
+        </p:nvCxnSpPr>
+        <p:spPr>
+          <a:xfrm flipH="1">
+            <a:off x="3431842" y="5265614"/>
+            <a:ext cx="952433" cy="0"/>
+          </a:xfrm>
+          <a:prstGeom prst="line">
+            <a:avLst/>
+          </a:prstGeom>
+          <a:ln w="127000">
+            <a:solidFill>
+              <a:schemeClr val="tx1"/>
+            </a:solidFill>
+            <a:tailEnd type="triangle"/>
+          </a:ln>
+        </p:spPr>
+        <p:style>
+          <a:lnRef idx="2">
+            <a:schemeClr val="accent1"/>
+          </a:lnRef>
+          <a:fillRef idx="0">
+            <a:schemeClr val="accent1"/>
+          </a:fillRef>
+          <a:effectRef idx="1">
+            <a:schemeClr val="accent1"/>
+          </a:effectRef>
+          <a:fontRef idx="minor">
+            <a:schemeClr val="tx1"/>
+          </a:fontRef>
+        </p:style>
+      </p:cxnSp>
+      <p:graphicFrame>
+        <p:nvGraphicFramePr>
+          <p:cNvPr id="57" name="Table 56"/>
+          <p:cNvGraphicFramePr>
+            <a:graphicFrameLocks noGrp="1"/>
+          </p:cNvGraphicFramePr>
+          <p:nvPr>
+            <p:extLst>
+              <p:ext uri="{D42A27DB-BD31-4B8C-83A1-F6EECF244321}">
+                <p14:modId xmlns:p14="http://schemas.microsoft.com/office/powerpoint/2010/main" val="2420716236"/>
+              </p:ext>
+            </p:extLst>
+          </p:nvPr>
+        </p:nvGraphicFramePr>
+        <p:xfrm>
+          <a:off x="2181312" y="1689406"/>
+          <a:ext cx="1439922" cy="1420660"/>
+        </p:xfrm>
+        <a:graphic>
+          <a:graphicData uri="http://schemas.openxmlformats.org/drawingml/2006/table">
+            <a:tbl>
+              <a:tblPr firstRow="1" bandRow="1">
+                <a:tableStyleId>{073A0DAA-6AF3-43AB-8588-CEC1D06C72B9}</a:tableStyleId>
+              </a:tblPr>
+              <a:tblGrid>
+                <a:gridCol w="1439922"/>
+              </a:tblGrid>
+              <a:tr h="546406">
+                <a:tc>
+                  <a:txBody>
+                    <a:bodyPr/>
+                    <a:lstStyle/>
+                    <a:p>
+                      <a:pPr marL="0" marR="0" indent="0" algn="l" defTabSz="914400" rtl="0" eaLnBrk="1" fontAlgn="auto" latinLnBrk="0" hangingPunct="1">
+                        <a:lnSpc>
+                          <a:spcPct val="100000"/>
+                        </a:lnSpc>
+                        <a:spcBef>
+                          <a:spcPts val="0"/>
+                        </a:spcBef>
+                        <a:spcAft>
+                          <a:spcPts val="0"/>
+                        </a:spcAft>
+                        <a:buClrTx/>
+                        <a:buSzTx/>
+                        <a:buFontTx/>
+                        <a:buNone/>
+                        <a:tabLst/>
+                        <a:defRPr/>
+                      </a:pPr>
+                      <a:r>
+                        <a:rPr lang="en-US" dirty="0" smtClean="0"/>
+                        <a:t>Enrollment</a:t>
+                      </a:r>
+                    </a:p>
+                    <a:p>
+                      <a:endParaRPr lang="en-US" dirty="0"/>
+                    </a:p>
+                  </a:txBody>
+                  <a:tcPr/>
+                </a:tc>
+              </a:tr>
+              <a:tr h="780580">
+                <a:tc>
+                  <a:txBody>
+                    <a:bodyPr/>
+                    <a:lstStyle/>
+                    <a:p>
+                      <a:endParaRPr lang="en-US" dirty="0"/>
+                    </a:p>
+                  </a:txBody>
+                  <a:tcPr/>
+                </a:tc>
+              </a:tr>
+            </a:tbl>
+          </a:graphicData>
+        </a:graphic>
+      </p:graphicFrame>
+      <p:graphicFrame>
+        <p:nvGraphicFramePr>
+          <p:cNvPr id="58" name="Table 57"/>
+          <p:cNvGraphicFramePr>
+            <a:graphicFrameLocks noGrp="1"/>
+          </p:cNvGraphicFramePr>
+          <p:nvPr>
+            <p:extLst>
+              <p:ext uri="{D42A27DB-BD31-4B8C-83A1-F6EECF244321}">
+                <p14:modId xmlns:p14="http://schemas.microsoft.com/office/powerpoint/2010/main" val="1424742959"/>
+              </p:ext>
+            </p:extLst>
+          </p:nvPr>
+        </p:nvGraphicFramePr>
+        <p:xfrm>
+          <a:off x="345850" y="1739983"/>
+          <a:ext cx="1140085" cy="1420660"/>
+        </p:xfrm>
+        <a:graphic>
+          <a:graphicData uri="http://schemas.openxmlformats.org/drawingml/2006/table">
+            <a:tbl>
+              <a:tblPr firstRow="1" bandRow="1">
+                <a:tableStyleId>{073A0DAA-6AF3-43AB-8588-CEC1D06C72B9}</a:tableStyleId>
+              </a:tblPr>
+              <a:tblGrid>
+                <a:gridCol w="1140085"/>
+              </a:tblGrid>
+              <a:tr h="546406">
+                <a:tc>
+                  <a:txBody>
+                    <a:bodyPr/>
+                    <a:lstStyle/>
+                    <a:p>
+                      <a:pPr marL="0" marR="0" indent="0" algn="l" defTabSz="914400" rtl="0" eaLnBrk="1" fontAlgn="auto" latinLnBrk="0" hangingPunct="1">
+                        <a:lnSpc>
+                          <a:spcPct val="100000"/>
+                        </a:lnSpc>
+                        <a:spcBef>
+                          <a:spcPts val="0"/>
+                        </a:spcBef>
+                        <a:spcAft>
+                          <a:spcPts val="0"/>
+                        </a:spcAft>
+                        <a:buClrTx/>
+                        <a:buSzTx/>
+                        <a:buFontTx/>
+                        <a:buNone/>
+                        <a:tabLst/>
+                        <a:defRPr/>
+                      </a:pPr>
+                      <a:r>
+                        <a:rPr lang="en-US" dirty="0" smtClean="0"/>
+                        <a:t>Students</a:t>
+                      </a:r>
+                    </a:p>
+                    <a:p>
+                      <a:endParaRPr lang="en-US" dirty="0"/>
+                    </a:p>
+                  </a:txBody>
+                  <a:tcPr/>
+                </a:tc>
+              </a:tr>
+              <a:tr h="780580">
+                <a:tc>
+                  <a:txBody>
+                    <a:bodyPr/>
+                    <a:lstStyle/>
+                    <a:p>
+                      <a:r>
+                        <a:rPr lang="en-US" dirty="0" smtClean="0"/>
+                        <a:t>Student</a:t>
+                      </a:r>
+                      <a:r>
+                        <a:rPr lang="en-US" baseline="0" dirty="0" smtClean="0"/>
+                        <a:t> Number</a:t>
+                      </a:r>
+                      <a:endParaRPr lang="en-US" dirty="0"/>
+                    </a:p>
+                  </a:txBody>
+                  <a:tcPr/>
+                </a:tc>
+              </a:tr>
+            </a:tbl>
+          </a:graphicData>
+        </a:graphic>
+      </p:graphicFrame>
+      <p:cxnSp>
+        <p:nvCxnSpPr>
+          <p:cNvPr id="59" name="Straight Connector 58"/>
+          <p:cNvCxnSpPr>
+            <a:stCxn id="57" idx="2"/>
+            <a:endCxn id="14" idx="0"/>
+          </p:cNvCxnSpPr>
+          <p:nvPr/>
+        </p:nvCxnSpPr>
+        <p:spPr>
+          <a:xfrm>
+            <a:off x="2901273" y="3110066"/>
+            <a:ext cx="0" cy="1378308"/>
+          </a:xfrm>
+          <a:prstGeom prst="line">
+            <a:avLst/>
+          </a:prstGeom>
+          <a:ln w="127000">
+            <a:solidFill>
+              <a:schemeClr val="tx1"/>
+            </a:solidFill>
+            <a:tailEnd type="triangle"/>
+          </a:ln>
+        </p:spPr>
+        <p:style>
+          <a:lnRef idx="2">
+            <a:schemeClr val="accent1"/>
+          </a:lnRef>
+          <a:fillRef idx="0">
+            <a:schemeClr val="accent1"/>
+          </a:fillRef>
+          <a:effectRef idx="1">
+            <a:schemeClr val="accent1"/>
+          </a:effectRef>
+          <a:fontRef idx="minor">
+            <a:schemeClr val="tx1"/>
+          </a:fontRef>
+        </p:style>
+      </p:cxnSp>
+      <p:cxnSp>
+        <p:nvCxnSpPr>
+          <p:cNvPr id="63" name="Straight Connector 62"/>
+          <p:cNvCxnSpPr>
+            <a:stCxn id="57" idx="3"/>
+          </p:cNvCxnSpPr>
+          <p:nvPr/>
+        </p:nvCxnSpPr>
+        <p:spPr>
+          <a:xfrm>
+            <a:off x="3621234" y="2399736"/>
+            <a:ext cx="3695502" cy="0"/>
+          </a:xfrm>
+          <a:prstGeom prst="line">
+            <a:avLst/>
+          </a:prstGeom>
+          <a:ln w="127000">
+            <a:solidFill>
+              <a:schemeClr val="tx1"/>
+            </a:solidFill>
+            <a:tailEnd type="triangle"/>
+          </a:ln>
+        </p:spPr>
+        <p:style>
+          <a:lnRef idx="2">
+            <a:schemeClr val="accent1"/>
+          </a:lnRef>
+          <a:fillRef idx="0">
+            <a:schemeClr val="accent1"/>
+          </a:fillRef>
+          <a:effectRef idx="1">
+            <a:schemeClr val="accent1"/>
+          </a:effectRef>
+          <a:fontRef idx="minor">
+            <a:schemeClr val="tx1"/>
+          </a:fontRef>
+        </p:style>
+      </p:cxnSp>
+      <p:cxnSp>
+        <p:nvCxnSpPr>
+          <p:cNvPr id="76" name="Straight Connector 75"/>
+          <p:cNvCxnSpPr>
+            <a:stCxn id="57" idx="1"/>
+          </p:cNvCxnSpPr>
+          <p:nvPr/>
+        </p:nvCxnSpPr>
+        <p:spPr>
+          <a:xfrm flipH="1">
+            <a:off x="1485936" y="2399736"/>
+            <a:ext cx="695376" cy="0"/>
+          </a:xfrm>
+          <a:prstGeom prst="line">
+            <a:avLst/>
+          </a:prstGeom>
+          <a:ln w="127000">
+            <a:solidFill>
+              <a:schemeClr val="tx1"/>
+            </a:solidFill>
+            <a:tailEnd type="triangle"/>
+          </a:ln>
+        </p:spPr>
+        <p:style>
+          <a:lnRef idx="2">
+            <a:schemeClr val="accent1"/>
+          </a:lnRef>
+          <a:fillRef idx="0">
+            <a:schemeClr val="accent1"/>
+          </a:fillRef>
+          <a:effectRef idx="1">
+            <a:schemeClr val="accent1"/>
+          </a:effectRef>
+          <a:fontRef idx="minor">
+            <a:schemeClr val="tx1"/>
+          </a:fontRef>
+        </p:style>
+      </p:cxnSp>
+    </p:spTree>
+    <p:extLst>
+      <p:ext uri="{BB962C8B-B14F-4D97-AF65-F5344CB8AC3E}">
+        <p14:creationId xmlns:p14="http://schemas.microsoft.com/office/powerpoint/2010/main" val="665529192"/>
+      </p:ext>
+    </p:extLst>
+  </p:cSld>
+  <p:clrMapOvr>
+    <a:masterClrMapping/>
+  </p:clrMapOvr>
+</p:sld>
+</file>
+
+<file path=ppt/slides/slide7.xml><?xml version="1.0" encoding="utf-8"?>
+<p:sld xmlns:a="http://schemas.openxmlformats.org/drawingml/2006/main" xmlns:r="http://schemas.openxmlformats.org/officeDocument/2006/relationships" xmlns:p="http://schemas.openxmlformats.org/presentationml/2006/main">
+  <p:cSld>
+    <p:spTree>
+      <p:nvGrpSpPr>
+        <p:cNvPr id="1" name=""/>
+        <p:cNvGrpSpPr/>
+        <p:nvPr/>
+      </p:nvGrpSpPr>
+      <p:grpSpPr>
+        <a:xfrm>
+          <a:off x="0" y="0"/>
+          <a:ext cx="0" cy="0"/>
+          <a:chOff x="0" y="0"/>
+          <a:chExt cx="0" cy="0"/>
+        </a:xfrm>
+      </p:grpSpPr>
+      <p:sp>
+        <p:nvSpPr>
+          <p:cNvPr id="2" name="Content Placeholder 1"/>
+          <p:cNvSpPr>
+            <a:spLocks noGrp="1"/>
+          </p:cNvSpPr>
+          <p:nvPr>
+            <p:ph idx="1"/>
+          </p:nvPr>
+        </p:nvSpPr>
+        <p:spPr>
+          <a:xfrm>
+            <a:off x="429398" y="698801"/>
+            <a:ext cx="6935423" cy="3657599"/>
           </a:xfrm>
         </p:spPr>
         <p:txBody>
@@ -5988,7 +7135,15 @@
           <a:p>
             <a:r>
               <a:rPr lang="en-US" sz="2400" dirty="0" smtClean="0"/>
-              <a:t>Review the questions and answers after class</a:t>
+              <a:t>Review </a:t>
+            </a:r>
+            <a:r>
+              <a:rPr lang="en-US" sz="2400" dirty="0" smtClean="0"/>
+              <a:t>questions </a:t>
+            </a:r>
+            <a:r>
+              <a:rPr lang="en-US" sz="2400" dirty="0" smtClean="0"/>
+              <a:t>and answers after class</a:t>
             </a:r>
           </a:p>
           <a:p>
@@ -6127,7 +7282,7 @@
 </p:sld>
 </file>
 
-<file path=ppt/slides/slide7.xml><?xml version="1.0" encoding="utf-8"?>
+<file path=ppt/slides/slide8.xml><?xml version="1.0" encoding="utf-8"?>
 <p:sld xmlns:a="http://schemas.openxmlformats.org/drawingml/2006/main" xmlns:r="http://schemas.openxmlformats.org/officeDocument/2006/relationships" xmlns:p="http://schemas.openxmlformats.org/presentationml/2006/main">
   <p:cSld>
     <p:spTree>
@@ -6224,12 +7379,8 @@
               <a:t>Student Answer </a:t>
             </a:r>
             <a:r>
-              <a:rPr lang="en-US" dirty="0" err="1"/>
-              <a:t>A</a:t>
-            </a:r>
-            <a:r>
-              <a:rPr lang="en-US" dirty="0" err="1" smtClean="0"/>
-              <a:t>naylsis</a:t>
+              <a:rPr lang="en-US" dirty="0" smtClean="0"/>
+              <a:t>Analysis</a:t>
             </a:r>
             <a:r>
               <a:rPr lang="en-US" dirty="0" smtClean="0"/>
@@ -6276,102 +7427,6 @@
 </p:sld>
 </file>
 
-<file path=ppt/slides/slide8.xml><?xml version="1.0" encoding="utf-8"?>
-<p:sld xmlns:a="http://schemas.openxmlformats.org/drawingml/2006/main" xmlns:r="http://schemas.openxmlformats.org/officeDocument/2006/relationships" xmlns:p="http://schemas.openxmlformats.org/presentationml/2006/main">
-  <p:cSld>
-    <p:spTree>
-      <p:nvGrpSpPr>
-        <p:cNvPr id="1" name=""/>
-        <p:cNvGrpSpPr/>
-        <p:nvPr/>
-      </p:nvGrpSpPr>
-      <p:grpSpPr>
-        <a:xfrm>
-          <a:off x="0" y="0"/>
-          <a:ext cx="0" cy="0"/>
-          <a:chOff x="0" y="0"/>
-          <a:chExt cx="0" cy="0"/>
-        </a:xfrm>
-      </p:grpSpPr>
-      <p:sp>
-        <p:nvSpPr>
-          <p:cNvPr id="2" name="Content Placeholder 1"/>
-          <p:cNvSpPr>
-            <a:spLocks noGrp="1"/>
-          </p:cNvSpPr>
-          <p:nvPr>
-            <p:ph idx="1"/>
-          </p:nvPr>
-        </p:nvSpPr>
-        <p:spPr/>
-        <p:txBody>
-          <a:bodyPr/>
-          <a:lstStyle/>
-          <a:p>
-            <a:endParaRPr lang="en-US"/>
-          </a:p>
-        </p:txBody>
-      </p:sp>
-      <p:sp>
-        <p:nvSpPr>
-          <p:cNvPr id="3" name="Title 2"/>
-          <p:cNvSpPr>
-            <a:spLocks noGrp="1"/>
-          </p:cNvSpPr>
-          <p:nvPr>
-            <p:ph type="title"/>
-          </p:nvPr>
-        </p:nvSpPr>
-        <p:spPr/>
-        <p:txBody>
-          <a:bodyPr/>
-          <a:lstStyle/>
-          <a:p>
-            <a:r>
-              <a:rPr lang="en-US" dirty="0" smtClean="0"/>
-              <a:t>Field Test</a:t>
-            </a:r>
-            <a:endParaRPr lang="en-US" dirty="0"/>
-          </a:p>
-        </p:txBody>
-      </p:sp>
-      <p:pic>
-        <p:nvPicPr>
-          <p:cNvPr id="4" name="Picture 3"/>
-          <p:cNvPicPr>
-            <a:picLocks noChangeAspect="1"/>
-          </p:cNvPicPr>
-          <p:nvPr/>
-        </p:nvPicPr>
-        <p:blipFill>
-          <a:blip r:embed="rId2"/>
-          <a:stretch>
-            <a:fillRect/>
-          </a:stretch>
-        </p:blipFill>
-        <p:spPr>
-          <a:xfrm>
-            <a:off x="7364822" y="111794"/>
-            <a:ext cx="1660040" cy="917575"/>
-          </a:xfrm>
-          <a:prstGeom prst="rect">
-            <a:avLst/>
-          </a:prstGeom>
-        </p:spPr>
-      </p:pic>
-    </p:spTree>
-    <p:extLst>
-      <p:ext uri="{BB962C8B-B14F-4D97-AF65-F5344CB8AC3E}">
-        <p14:creationId xmlns:p14="http://schemas.microsoft.com/office/powerpoint/2010/main" val="100663824"/>
-      </p:ext>
-    </p:extLst>
-  </p:cSld>
-  <p:clrMapOvr>
-    <a:masterClrMapping/>
-  </p:clrMapOvr>
-</p:sld>
-</file>
-
 <file path=ppt/slides/slide9.xml><?xml version="1.0" encoding="utf-8"?>
 <p:sld xmlns:a="http://schemas.openxmlformats.org/drawingml/2006/main" xmlns:r="http://schemas.openxmlformats.org/officeDocument/2006/relationships" xmlns:p="http://schemas.openxmlformats.org/presentationml/2006/main">
   <p:cSld>
@@ -6399,81 +7454,33 @@
             <p:ph idx="1"/>
           </p:nvPr>
         </p:nvSpPr>
-        <p:spPr>
-          <a:xfrm>
-            <a:off x="1709979" y="1352888"/>
-            <a:ext cx="6096000" cy="3657599"/>
-          </a:xfrm>
-        </p:spPr>
+        <p:spPr/>
         <p:txBody>
           <a:bodyPr/>
           <a:lstStyle/>
           <a:p>
+            <a:endParaRPr lang="en-US"/>
+          </a:p>
+        </p:txBody>
+      </p:sp>
+      <p:sp>
+        <p:nvSpPr>
+          <p:cNvPr id="3" name="Title 2"/>
+          <p:cNvSpPr>
+            <a:spLocks noGrp="1"/>
+          </p:cNvSpPr>
+          <p:nvPr>
+            <p:ph type="title"/>
+          </p:nvPr>
+        </p:nvSpPr>
+        <p:spPr/>
+        <p:txBody>
+          <a:bodyPr/>
+          <a:lstStyle/>
+          <a:p>
             <a:r>
               <a:rPr lang="en-US" dirty="0" smtClean="0"/>
-              <a:t>Portability for different environment</a:t>
-            </a:r>
-          </a:p>
-          <a:p>
-            <a:r>
-              <a:rPr lang="en-US" dirty="0" smtClean="0"/>
-              <a:t>Open Source</a:t>
-            </a:r>
-          </a:p>
-          <a:p>
-            <a:r>
-              <a:rPr lang="en-US" dirty="0" smtClean="0"/>
-              <a:t>Security</a:t>
-            </a:r>
-          </a:p>
-          <a:p>
-            <a:r>
-              <a:rPr lang="en-US" dirty="0"/>
-              <a:t>Installation </a:t>
-            </a:r>
-            <a:r>
-              <a:rPr lang="en-US" dirty="0" smtClean="0"/>
-              <a:t>kit</a:t>
-            </a:r>
-          </a:p>
-          <a:p>
-            <a:r>
-              <a:rPr lang="en-US" dirty="0" smtClean="0"/>
-              <a:t>Localization</a:t>
-            </a:r>
-          </a:p>
-          <a:p>
-            <a:pPr marL="18288" indent="0">
-              <a:buNone/>
-            </a:pPr>
-            <a:r>
-              <a:rPr lang="en-US" dirty="0" smtClean="0"/>
-              <a:t> </a:t>
-            </a:r>
-          </a:p>
-          <a:p>
-            <a:endParaRPr lang="en-US" dirty="0"/>
-          </a:p>
-        </p:txBody>
-      </p:sp>
-      <p:sp>
-        <p:nvSpPr>
-          <p:cNvPr id="3" name="Title 2"/>
-          <p:cNvSpPr>
-            <a:spLocks noGrp="1"/>
-          </p:cNvSpPr>
-          <p:nvPr>
-            <p:ph type="title"/>
-          </p:nvPr>
-        </p:nvSpPr>
-        <p:spPr/>
-        <p:txBody>
-          <a:bodyPr/>
-          <a:lstStyle/>
-          <a:p>
-            <a:r>
-              <a:rPr lang="en-US" dirty="0" smtClean="0"/>
-              <a:t>The Next Steps </a:t>
+              <a:t>Field Test</a:t>
             </a:r>
             <a:endParaRPr lang="en-US" dirty="0"/>
           </a:p>

</xml_diff>